<commit_message>
Changed text cells type to markdown for better readability and removed incorrect values from powerpoint
</commit_message>
<xml_diff>
--- a/ML Project2 Fraud Detection Presentation.pptx
+++ b/ML Project2 Fraud Detection Presentation.pptx
@@ -311,7 +311,7 @@
           <a:p>
             <a:fld id="{5BCAD085-E8A6-8845-BD4E-CB4CCA059FC4}" type="datetimeFigureOut">
               <a:rPr lang="en-US" smtClean="0"/>
-              <a:t>12/3/2025</a:t>
+              <a:t>12/5/2025</a:t>
             </a:fld>
             <a:endParaRPr lang="en-US"/>
           </a:p>
@@ -479,7 +479,7 @@
           <a:p>
             <a:fld id="{5BCAD085-E8A6-8845-BD4E-CB4CCA059FC4}" type="datetimeFigureOut">
               <a:rPr lang="en-US" smtClean="0"/>
-              <a:t>12/3/2025</a:t>
+              <a:t>12/5/2025</a:t>
             </a:fld>
             <a:endParaRPr lang="en-US"/>
           </a:p>
@@ -657,7 +657,7 @@
           <a:p>
             <a:fld id="{5BCAD085-E8A6-8845-BD4E-CB4CCA059FC4}" type="datetimeFigureOut">
               <a:rPr lang="en-US" smtClean="0"/>
-              <a:t>12/3/2025</a:t>
+              <a:t>12/5/2025</a:t>
             </a:fld>
             <a:endParaRPr lang="en-US"/>
           </a:p>
@@ -825,7 +825,7 @@
           <a:p>
             <a:fld id="{5BCAD085-E8A6-8845-BD4E-CB4CCA059FC4}" type="datetimeFigureOut">
               <a:rPr lang="en-US" smtClean="0"/>
-              <a:t>12/3/2025</a:t>
+              <a:t>12/5/2025</a:t>
             </a:fld>
             <a:endParaRPr lang="en-US"/>
           </a:p>
@@ -1070,7 +1070,7 @@
           <a:p>
             <a:fld id="{5BCAD085-E8A6-8845-BD4E-CB4CCA059FC4}" type="datetimeFigureOut">
               <a:rPr lang="en-US" smtClean="0"/>
-              <a:t>12/3/2025</a:t>
+              <a:t>12/5/2025</a:t>
             </a:fld>
             <a:endParaRPr lang="en-US"/>
           </a:p>
@@ -1355,7 +1355,7 @@
           <a:p>
             <a:fld id="{5BCAD085-E8A6-8845-BD4E-CB4CCA059FC4}" type="datetimeFigureOut">
               <a:rPr lang="en-US" smtClean="0"/>
-              <a:t>12/3/2025</a:t>
+              <a:t>12/5/2025</a:t>
             </a:fld>
             <a:endParaRPr lang="en-US"/>
           </a:p>
@@ -1774,7 +1774,7 @@
           <a:p>
             <a:fld id="{5BCAD085-E8A6-8845-BD4E-CB4CCA059FC4}" type="datetimeFigureOut">
               <a:rPr lang="en-US" smtClean="0"/>
-              <a:t>12/3/2025</a:t>
+              <a:t>12/5/2025</a:t>
             </a:fld>
             <a:endParaRPr lang="en-US"/>
           </a:p>
@@ -1891,7 +1891,7 @@
           <a:p>
             <a:fld id="{5BCAD085-E8A6-8845-BD4E-CB4CCA059FC4}" type="datetimeFigureOut">
               <a:rPr lang="en-US" smtClean="0"/>
-              <a:t>12/3/2025</a:t>
+              <a:t>12/5/2025</a:t>
             </a:fld>
             <a:endParaRPr lang="en-US"/>
           </a:p>
@@ -1986,7 +1986,7 @@
           <a:p>
             <a:fld id="{5BCAD085-E8A6-8845-BD4E-CB4CCA059FC4}" type="datetimeFigureOut">
               <a:rPr lang="en-US" smtClean="0"/>
-              <a:t>12/3/2025</a:t>
+              <a:t>12/5/2025</a:t>
             </a:fld>
             <a:endParaRPr lang="en-US"/>
           </a:p>
@@ -2261,7 +2261,7 @@
           <a:p>
             <a:fld id="{5BCAD085-E8A6-8845-BD4E-CB4CCA059FC4}" type="datetimeFigureOut">
               <a:rPr lang="en-US" smtClean="0"/>
-              <a:t>12/3/2025</a:t>
+              <a:t>12/5/2025</a:t>
             </a:fld>
             <a:endParaRPr lang="en-US"/>
           </a:p>
@@ -2513,7 +2513,7 @@
           <a:p>
             <a:fld id="{5BCAD085-E8A6-8845-BD4E-CB4CCA059FC4}" type="datetimeFigureOut">
               <a:rPr lang="en-US" smtClean="0"/>
-              <a:t>12/3/2025</a:t>
+              <a:t>12/5/2025</a:t>
             </a:fld>
             <a:endParaRPr lang="en-US"/>
           </a:p>
@@ -2724,7 +2724,7 @@
           <a:p>
             <a:fld id="{5BCAD085-E8A6-8845-BD4E-CB4CCA059FC4}" type="datetimeFigureOut">
               <a:rPr lang="en-US" smtClean="0"/>
-              <a:t>12/3/2025</a:t>
+              <a:t>12/5/2025</a:t>
             </a:fld>
             <a:endParaRPr lang="en-US"/>
           </a:p>
@@ -3917,12 +3917,14 @@
         </p:nvSpPr>
         <p:spPr>
           <a:xfrm>
-            <a:off x="457200" y="1600201"/>
-            <a:ext cx="8229600" cy="2500460"/>
+            <a:off x="457200" y="1694468"/>
+            <a:ext cx="8229600" cy="3396006"/>
           </a:xfrm>
         </p:spPr>
         <p:txBody>
-          <a:bodyPr/>
+          <a:bodyPr>
+            <a:normAutofit fontScale="92500" lnSpcReduction="20000"/>
+          </a:bodyPr>
           <a:lstStyle/>
           <a:p>
             <a:endParaRPr dirty="0"/>
@@ -3983,6 +3985,80 @@
               </a:rPr>
               <a:t>• Target: Fraud (binary).</a:t>
             </a:r>
+            <a:endParaRPr lang="en-US" sz="2200" dirty="0">
+              <a:solidFill>
+                <a:srgbClr val="C8C8C8"/>
+              </a:solidFill>
+            </a:endParaRPr>
+          </a:p>
+          <a:p>
+            <a:r>
+              <a:rPr lang="en-US" sz="2200" dirty="0">
+                <a:solidFill>
+                  <a:srgbClr val="C8C8C8"/>
+                </a:solidFill>
+              </a:rPr>
+              <a:t>Top Predictors: </a:t>
+            </a:r>
+          </a:p>
+          <a:p>
+            <a:pPr lvl="1"/>
+            <a:r>
+              <a:rPr lang="en-GB" sz="2200" dirty="0">
+                <a:solidFill>
+                  <a:srgbClr val="C8C8C8"/>
+                </a:solidFill>
+              </a:rPr>
+              <a:t>Financial: </a:t>
+            </a:r>
+            <a:r>
+              <a:rPr lang="en-GB" sz="2200" dirty="0" err="1">
+                <a:solidFill>
+                  <a:srgbClr val="C8C8C8"/>
+                </a:solidFill>
+              </a:rPr>
+              <a:t>TotalReimbursement</a:t>
+            </a:r>
+            <a:r>
+              <a:rPr lang="en-GB" sz="2200" dirty="0">
+                <a:solidFill>
+                  <a:srgbClr val="C8C8C8"/>
+                </a:solidFill>
+              </a:rPr>
+              <a:t> (Fraudsters bill significantly higher amounts).</a:t>
+            </a:r>
+          </a:p>
+          <a:p>
+            <a:pPr lvl="1"/>
+            <a:r>
+              <a:rPr lang="en-GB" sz="2200" dirty="0">
+                <a:solidFill>
+                  <a:srgbClr val="C8C8C8"/>
+                </a:solidFill>
+              </a:rPr>
+              <a:t>Patient Health: </a:t>
+            </a:r>
+            <a:r>
+              <a:rPr lang="en-GB" sz="2200" dirty="0" err="1">
+                <a:solidFill>
+                  <a:srgbClr val="C8C8C8"/>
+                </a:solidFill>
+              </a:rPr>
+              <a:t>ChronicCond_KidneyDisease</a:t>
+            </a:r>
+            <a:r>
+              <a:rPr lang="en-GB" sz="2200" dirty="0">
+                <a:solidFill>
+                  <a:srgbClr val="C8C8C8"/>
+                </a:solidFill>
+              </a:rPr>
+              <a:t> (Fraudsters often target vulnerable patients with complex needs).</a:t>
+            </a:r>
+            <a:endParaRPr sz="2200" dirty="0">
+              <a:solidFill>
+                <a:srgbClr val="C8C8C8"/>
+              </a:solidFill>
+            </a:endParaRPr>
           </a:p>
           <a:p>
             <a:endParaRPr sz="2200" dirty="0">
@@ -4526,60 +4602,54 @@
           <a:bodyPr/>
           <a:lstStyle/>
           <a:p>
-            <a:endParaRPr/>
-          </a:p>
-          <a:p>
-            <a:r>
-              <a:rPr sz="2200">
+            <a:endParaRPr dirty="0"/>
+          </a:p>
+          <a:p>
+            <a:r>
+              <a:rPr sz="2200" dirty="0">
                 <a:solidFill>
                   <a:srgbClr val="C8C8C8"/>
                 </a:solidFill>
               </a:rPr>
-              <a:t>• Precision: 0.46</a:t>
-            </a:r>
-          </a:p>
-          <a:p>
-            <a:r>
-              <a:rPr sz="2200">
+              <a:t>• Precision: </a:t>
+            </a:r>
+            <a:r>
+              <a:rPr lang="en-GB" sz="2200" dirty="0">
                 <a:solidFill>
                   <a:srgbClr val="C8C8C8"/>
                 </a:solidFill>
               </a:rPr>
-              <a:t>• Recall: 0.90</a:t>
-            </a:r>
-          </a:p>
-          <a:p>
-            <a:r>
-              <a:rPr sz="2200">
+              <a:t>0.95</a:t>
+            </a:r>
+          </a:p>
+          <a:p>
+            <a:r>
+              <a:rPr lang="en-GB" sz="2200" dirty="0">
                 <a:solidFill>
                   <a:srgbClr val="C8C8C8"/>
                 </a:solidFill>
               </a:rPr>
-              <a:t>• F1: 0.61</a:t>
-            </a:r>
-          </a:p>
-          <a:p>
-            <a:r>
-              <a:rPr sz="2200">
+              <a:t>• Recall: 1.00</a:t>
+            </a:r>
+          </a:p>
+          <a:p>
+            <a:r>
+              <a:rPr sz="2200" dirty="0">
                 <a:solidFill>
                   <a:srgbClr val="C8C8C8"/>
                 </a:solidFill>
               </a:rPr>
-              <a:t>• ROC‑AUC: 0.97</a:t>
-            </a:r>
-          </a:p>
-          <a:p>
-            <a:r>
-              <a:rPr sz="2200">
+              <a:t>• F1: 0.</a:t>
+            </a:r>
+            <a:r>
+              <a:rPr lang="en-US" sz="2200" dirty="0">
                 <a:solidFill>
                   <a:srgbClr val="C8C8C8"/>
                 </a:solidFill>
               </a:rPr>
-              <a:t>• PR‑AUC: 0.79</a:t>
-            </a:r>
-          </a:p>
-          <a:p>
-            <a:endParaRPr sz="2200">
+              <a:t>98</a:t>
+            </a:r>
+            <a:endParaRPr sz="2200" dirty="0">
               <a:solidFill>
                 <a:srgbClr val="C8C8C8"/>
               </a:solidFill>
@@ -4587,20 +4657,66 @@
           </a:p>
           <a:p>
             <a:r>
-              <a:rPr sz="2200">
+              <a:rPr sz="2200" dirty="0">
                 <a:solidFill>
                   <a:srgbClr val="C8C8C8"/>
                 </a:solidFill>
               </a:rPr>
-              <a:t>High Recall → catches most fraud cases.</a:t>
-            </a:r>
-          </a:p>
-          <a:p>
-            <a:endParaRPr sz="2200">
+              <a:t>• ROC‑AUC: </a:t>
+            </a:r>
+            <a:r>
+              <a:rPr lang="en-US" sz="2200" dirty="0">
+                <a:solidFill>
+                  <a:srgbClr val="C8C8C8"/>
+                </a:solidFill>
+              </a:rPr>
+              <a:t>1.00</a:t>
+            </a:r>
+            <a:endParaRPr sz="2200" dirty="0">
               <a:solidFill>
                 <a:srgbClr val="C8C8C8"/>
               </a:solidFill>
             </a:endParaRPr>
+          </a:p>
+          <a:p>
+            <a:r>
+              <a:rPr sz="2200" dirty="0">
+                <a:solidFill>
+                  <a:srgbClr val="C8C8C8"/>
+                </a:solidFill>
+              </a:rPr>
+              <a:t>• PR‑AUC: </a:t>
+            </a:r>
+            <a:r>
+              <a:rPr lang="en-US" sz="2200" dirty="0">
+                <a:solidFill>
+                  <a:srgbClr val="C8C8C8"/>
+                </a:solidFill>
+              </a:rPr>
+              <a:t>1.00</a:t>
+            </a:r>
+            <a:endParaRPr sz="2200" dirty="0">
+              <a:solidFill>
+                <a:srgbClr val="C8C8C8"/>
+              </a:solidFill>
+            </a:endParaRPr>
+          </a:p>
+          <a:p>
+            <a:endParaRPr sz="2200" dirty="0">
+              <a:solidFill>
+                <a:srgbClr val="C8C8C8"/>
+              </a:solidFill>
+            </a:endParaRPr>
+          </a:p>
+          <a:p>
+            <a:r>
+              <a:rPr lang="en-GB" sz="2200" dirty="0">
+                <a:solidFill>
+                  <a:srgbClr val="C8C8C8"/>
+                </a:solidFill>
+              </a:rPr>
+              <a:t>High Recall (1.0) -&gt; catches all known fraud cases in the test set</a:t>
+            </a:r>
           </a:p>
         </p:txBody>
       </p:sp>

</xml_diff>